<commit_message>
added leafwise splits docs
</commit_message>
<xml_diff>
--- a/final presentation/Home Credit Default Risk modified.pptx
+++ b/final presentation/Home Credit Default Risk modified.pptx
@@ -4878,6 +4878,18 @@
   <p:clrMapOvr>
     <a:masterClrMapping/>
   </p:clrMapOvr>
+  <mc:AlternateContent xmlns:mc="http://schemas.openxmlformats.org/markup-compatibility/2006">
+    <mc:Choice xmlns:p14="http://schemas.microsoft.com/office/powerpoint/2010/main" Requires="p14">
+      <p:transition spd="med" p14:dur="700">
+        <p:fade/>
+      </p:transition>
+    </mc:Choice>
+    <mc:Fallback>
+      <p:transition spd="med">
+        <p:fade/>
+      </p:transition>
+    </mc:Fallback>
+  </mc:AlternateContent>
 </p:sld>
 </file>
 
@@ -5955,6 +5967,18 @@
   <p:clrMapOvr>
     <a:masterClrMapping/>
   </p:clrMapOvr>
+  <mc:AlternateContent xmlns:mc="http://schemas.openxmlformats.org/markup-compatibility/2006">
+    <mc:Choice xmlns:p14="http://schemas.microsoft.com/office/powerpoint/2010/main" Requires="p14">
+      <p:transition spd="med" p14:dur="700">
+        <p:fade/>
+      </p:transition>
+    </mc:Choice>
+    <mc:Fallback>
+      <p:transition spd="med">
+        <p:fade/>
+      </p:transition>
+    </mc:Fallback>
+  </mc:AlternateContent>
 </p:sld>
 </file>
 
@@ -6752,6 +6776,18 @@
   <p:clrMapOvr>
     <a:masterClrMapping/>
   </p:clrMapOvr>
+  <mc:AlternateContent xmlns:mc="http://schemas.openxmlformats.org/markup-compatibility/2006">
+    <mc:Choice xmlns:p14="http://schemas.microsoft.com/office/powerpoint/2010/main" Requires="p14">
+      <p:transition spd="med" p14:dur="700">
+        <p:fade/>
+      </p:transition>
+    </mc:Choice>
+    <mc:Fallback>
+      <p:transition spd="med">
+        <p:fade/>
+      </p:transition>
+    </mc:Fallback>
+  </mc:AlternateContent>
 </p:sld>
 </file>
 
@@ -7893,6 +7929,18 @@
   <p:clrMapOvr>
     <a:masterClrMapping/>
   </p:clrMapOvr>
+  <mc:AlternateContent xmlns:mc="http://schemas.openxmlformats.org/markup-compatibility/2006">
+    <mc:Choice xmlns:p14="http://schemas.microsoft.com/office/powerpoint/2010/main" Requires="p14">
+      <p:transition spd="med" p14:dur="700">
+        <p:fade/>
+      </p:transition>
+    </mc:Choice>
+    <mc:Fallback>
+      <p:transition spd="med">
+        <p:fade/>
+      </p:transition>
+    </mc:Fallback>
+  </mc:AlternateContent>
 </p:sld>
 </file>
 
@@ -8816,6 +8864,18 @@
   <p:clrMapOvr>
     <a:masterClrMapping/>
   </p:clrMapOvr>
+  <mc:AlternateContent xmlns:mc="http://schemas.openxmlformats.org/markup-compatibility/2006">
+    <mc:Choice xmlns:p14="http://schemas.microsoft.com/office/powerpoint/2010/main" Requires="p14">
+      <p:transition spd="med" p14:dur="700">
+        <p:fade/>
+      </p:transition>
+    </mc:Choice>
+    <mc:Fallback>
+      <p:transition spd="med">
+        <p:fade/>
+      </p:transition>
+    </mc:Fallback>
+  </mc:AlternateContent>
 </p:sld>
 </file>
 
@@ -10699,6 +10759,18 @@
   <p:clrMapOvr>
     <a:masterClrMapping/>
   </p:clrMapOvr>
+  <mc:AlternateContent xmlns:mc="http://schemas.openxmlformats.org/markup-compatibility/2006">
+    <mc:Choice xmlns:p14="http://schemas.microsoft.com/office/powerpoint/2010/main" Requires="p14">
+      <p:transition spd="med" p14:dur="700">
+        <p:fade/>
+      </p:transition>
+    </mc:Choice>
+    <mc:Fallback>
+      <p:transition spd="med">
+        <p:fade/>
+      </p:transition>
+    </mc:Fallback>
+  </mc:AlternateContent>
 </p:sld>
 </file>
 
@@ -11434,6 +11506,18 @@
   <p:clrMapOvr>
     <a:masterClrMapping/>
   </p:clrMapOvr>
+  <mc:AlternateContent xmlns:mc="http://schemas.openxmlformats.org/markup-compatibility/2006">
+    <mc:Choice xmlns:p14="http://schemas.microsoft.com/office/powerpoint/2010/main" Requires="p14">
+      <p:transition spd="med" p14:dur="700">
+        <p:fade/>
+      </p:transition>
+    </mc:Choice>
+    <mc:Fallback>
+      <p:transition spd="med">
+        <p:fade/>
+      </p:transition>
+    </mc:Fallback>
+  </mc:AlternateContent>
 </p:sld>
 </file>
 
@@ -12205,6 +12289,18 @@
   <p:clrMapOvr>
     <a:masterClrMapping/>
   </p:clrMapOvr>
+  <mc:AlternateContent xmlns:mc="http://schemas.openxmlformats.org/markup-compatibility/2006">
+    <mc:Choice xmlns:p14="http://schemas.microsoft.com/office/powerpoint/2010/main" Requires="p14">
+      <p:transition spd="med" p14:dur="700">
+        <p:fade/>
+      </p:transition>
+    </mc:Choice>
+    <mc:Fallback>
+      <p:transition spd="med">
+        <p:fade/>
+      </p:transition>
+    </mc:Fallback>
+  </mc:AlternateContent>
 </p:sld>
 </file>
 
@@ -12978,6 +13074,18 @@
   <p:clrMapOvr>
     <a:masterClrMapping/>
   </p:clrMapOvr>
+  <mc:AlternateContent xmlns:mc="http://schemas.openxmlformats.org/markup-compatibility/2006">
+    <mc:Choice xmlns:p14="http://schemas.microsoft.com/office/powerpoint/2010/main" Requires="p14">
+      <p:transition spd="med" p14:dur="700">
+        <p:fade/>
+      </p:transition>
+    </mc:Choice>
+    <mc:Fallback>
+      <p:transition spd="med">
+        <p:fade/>
+      </p:transition>
+    </mc:Fallback>
+  </mc:AlternateContent>
 </p:sld>
 </file>
 
@@ -14532,6 +14640,18 @@
   <p:clrMapOvr>
     <a:masterClrMapping/>
   </p:clrMapOvr>
+  <mc:AlternateContent xmlns:mc="http://schemas.openxmlformats.org/markup-compatibility/2006">
+    <mc:Choice xmlns:p14="http://schemas.microsoft.com/office/powerpoint/2010/main" Requires="p14">
+      <p:transition spd="med" p14:dur="700">
+        <p:fade/>
+      </p:transition>
+    </mc:Choice>
+    <mc:Fallback>
+      <p:transition spd="med">
+        <p:fade/>
+      </p:transition>
+    </mc:Fallback>
+  </mc:AlternateContent>
 </p:sld>
 </file>
 
@@ -16932,6 +17052,151 @@
   <p:clrMapOvr>
     <a:masterClrMapping/>
   </p:clrMapOvr>
+  <mc:AlternateContent xmlns:mc="http://schemas.openxmlformats.org/markup-compatibility/2006">
+    <mc:Choice xmlns:p14="http://schemas.microsoft.com/office/powerpoint/2010/main" Requires="p14">
+      <p:transition spd="med" p14:dur="700">
+        <p:fade/>
+      </p:transition>
+    </mc:Choice>
+    <mc:Fallback>
+      <p:transition spd="med">
+        <p:fade/>
+      </p:transition>
+    </mc:Fallback>
+  </mc:AlternateContent>
+  <p:timing>
+    <p:tnLst>
+      <p:par>
+        <p:cTn id="1" dur="indefinite" restart="never" nodeType="tmRoot">
+          <p:childTnLst>
+            <p:seq concurrent="1" nextAc="seek">
+              <p:cTn id="2" dur="indefinite" nodeType="mainSeq">
+                <p:childTnLst>
+                  <p:par>
+                    <p:cTn id="3" fill="hold">
+                      <p:stCondLst>
+                        <p:cond delay="indefinite"/>
+                      </p:stCondLst>
+                      <p:childTnLst>
+                        <p:par>
+                          <p:cTn id="4" fill="hold">
+                            <p:stCondLst>
+                              <p:cond delay="0"/>
+                            </p:stCondLst>
+                            <p:childTnLst>
+                              <p:par>
+                                <p:cTn id="5" presetID="2" presetClass="entr" presetSubtype="4" fill="hold" nodeType="clickEffect">
+                                  <p:stCondLst>
+                                    <p:cond delay="0"/>
+                                  </p:stCondLst>
+                                  <p:childTnLst>
+                                    <p:set>
+                                      <p:cBhvr>
+                                        <p:cTn id="6" dur="1" fill="hold">
+                                          <p:stCondLst>
+                                            <p:cond delay="0"/>
+                                          </p:stCondLst>
+                                        </p:cTn>
+                                        <p:tgtEl>
+                                          <p:spTgt spid="39">
+                                            <p:txEl>
+                                              <p:pRg st="0" end="0"/>
+                                            </p:txEl>
+                                          </p:spTgt>
+                                        </p:tgtEl>
+                                        <p:attrNameLst>
+                                          <p:attrName>style.visibility</p:attrName>
+                                        </p:attrNameLst>
+                                      </p:cBhvr>
+                                      <p:to>
+                                        <p:strVal val="visible"/>
+                                      </p:to>
+                                    </p:set>
+                                    <p:anim calcmode="lin" valueType="num">
+                                      <p:cBhvr additive="base">
+                                        <p:cTn id="7" dur="500" fill="hold"/>
+                                        <p:tgtEl>
+                                          <p:spTgt spid="39">
+                                            <p:txEl>
+                                              <p:pRg st="0" end="0"/>
+                                            </p:txEl>
+                                          </p:spTgt>
+                                        </p:tgtEl>
+                                        <p:attrNameLst>
+                                          <p:attrName>ppt_x</p:attrName>
+                                        </p:attrNameLst>
+                                      </p:cBhvr>
+                                      <p:tavLst>
+                                        <p:tav tm="0">
+                                          <p:val>
+                                            <p:strVal val="#ppt_x"/>
+                                          </p:val>
+                                        </p:tav>
+                                        <p:tav tm="100000">
+                                          <p:val>
+                                            <p:strVal val="#ppt_x"/>
+                                          </p:val>
+                                        </p:tav>
+                                      </p:tavLst>
+                                    </p:anim>
+                                    <p:anim calcmode="lin" valueType="num">
+                                      <p:cBhvr additive="base">
+                                        <p:cTn id="8" dur="500" fill="hold"/>
+                                        <p:tgtEl>
+                                          <p:spTgt spid="39">
+                                            <p:txEl>
+                                              <p:pRg st="0" end="0"/>
+                                            </p:txEl>
+                                          </p:spTgt>
+                                        </p:tgtEl>
+                                        <p:attrNameLst>
+                                          <p:attrName>ppt_y</p:attrName>
+                                        </p:attrNameLst>
+                                      </p:cBhvr>
+                                      <p:tavLst>
+                                        <p:tav tm="0">
+                                          <p:val>
+                                            <p:strVal val="1+#ppt_h/2"/>
+                                          </p:val>
+                                        </p:tav>
+                                        <p:tav tm="100000">
+                                          <p:val>
+                                            <p:strVal val="#ppt_y"/>
+                                          </p:val>
+                                        </p:tav>
+                                      </p:tavLst>
+                                    </p:anim>
+                                  </p:childTnLst>
+                                </p:cTn>
+                              </p:par>
+                            </p:childTnLst>
+                          </p:cTn>
+                        </p:par>
+                      </p:childTnLst>
+                    </p:cTn>
+                  </p:par>
+                </p:childTnLst>
+              </p:cTn>
+              <p:prevCondLst>
+                <p:cond evt="onPrev" delay="0">
+                  <p:tgtEl>
+                    <p:sldTgt/>
+                  </p:tgtEl>
+                </p:cond>
+              </p:prevCondLst>
+              <p:nextCondLst>
+                <p:cond evt="onNext" delay="0">
+                  <p:tgtEl>
+                    <p:sldTgt/>
+                  </p:tgtEl>
+                </p:cond>
+              </p:nextCondLst>
+            </p:seq>
+          </p:childTnLst>
+        </p:cTn>
+      </p:par>
+    </p:tnLst>
+  </p:timing>
 </p:sld>
 </file>
 
@@ -18290,6 +18555,18 @@
   <p:clrMapOvr>
     <a:masterClrMapping/>
   </p:clrMapOvr>
+  <mc:AlternateContent xmlns:mc="http://schemas.openxmlformats.org/markup-compatibility/2006">
+    <mc:Choice xmlns:p14="http://schemas.microsoft.com/office/powerpoint/2010/main" Requires="p14">
+      <p:transition spd="med" p14:dur="700">
+        <p:fade/>
+      </p:transition>
+    </mc:Choice>
+    <mc:Fallback>
+      <p:transition spd="med">
+        <p:fade/>
+      </p:transition>
+    </mc:Fallback>
+  </mc:AlternateContent>
 </p:sld>
 </file>
 
@@ -19493,6 +19770,18 @@
   <p:clrMapOvr>
     <a:masterClrMapping/>
   </p:clrMapOvr>
+  <mc:AlternateContent xmlns:mc="http://schemas.openxmlformats.org/markup-compatibility/2006">
+    <mc:Choice xmlns:p14="http://schemas.microsoft.com/office/powerpoint/2010/main" Requires="p14">
+      <p:transition spd="med" p14:dur="700">
+        <p:fade/>
+      </p:transition>
+    </mc:Choice>
+    <mc:Fallback>
+      <p:transition spd="med">
+        <p:fade/>
+      </p:transition>
+    </mc:Fallback>
+  </mc:AlternateContent>
 </p:sld>
 </file>
 
@@ -20576,6 +20865,18 @@
   <p:clrMapOvr>
     <a:masterClrMapping/>
   </p:clrMapOvr>
+  <mc:AlternateContent xmlns:mc="http://schemas.openxmlformats.org/markup-compatibility/2006">
+    <mc:Choice xmlns:p14="http://schemas.microsoft.com/office/powerpoint/2010/main" Requires="p14">
+      <p:transition spd="med" p14:dur="700">
+        <p:fade/>
+      </p:transition>
+    </mc:Choice>
+    <mc:Fallback>
+      <p:transition spd="med">
+        <p:fade/>
+      </p:transition>
+    </mc:Fallback>
+  </mc:AlternateContent>
 </p:sld>
 </file>
 
@@ -21607,6 +21908,18 @@
   <p:clrMapOvr>
     <a:masterClrMapping/>
   </p:clrMapOvr>
+  <mc:AlternateContent xmlns:mc="http://schemas.openxmlformats.org/markup-compatibility/2006">
+    <mc:Choice xmlns:p14="http://schemas.microsoft.com/office/powerpoint/2010/main" Requires="p14">
+      <p:transition spd="med" p14:dur="700">
+        <p:fade/>
+      </p:transition>
+    </mc:Choice>
+    <mc:Fallback>
+      <p:transition spd="med">
+        <p:fade/>
+      </p:transition>
+    </mc:Fallback>
+  </mc:AlternateContent>
 </p:sld>
 </file>
 
@@ -22713,6 +23026,18 @@
   <p:clrMapOvr>
     <a:masterClrMapping/>
   </p:clrMapOvr>
+  <mc:AlternateContent xmlns:mc="http://schemas.openxmlformats.org/markup-compatibility/2006">
+    <mc:Choice xmlns:p14="http://schemas.microsoft.com/office/powerpoint/2010/main" Requires="p14">
+      <p:transition spd="med" p14:dur="700">
+        <p:fade/>
+      </p:transition>
+    </mc:Choice>
+    <mc:Fallback>
+      <p:transition spd="med">
+        <p:fade/>
+      </p:transition>
+    </mc:Fallback>
+  </mc:AlternateContent>
 </p:sld>
 </file>
 

</xml_diff>

<commit_message>
adding extra test set sampled
</commit_message>
<xml_diff>
--- a/final presentation/Home Credit Default Risk modified.pptx
+++ b/final presentation/Home Credit Default Risk modified.pptx
@@ -5,10 +5,10 @@
     <p:sldMasterId id="2147483648" r:id="rId1"/>
   </p:sldMasterIdLst>
   <p:notesMasterIdLst>
-    <p:notesMasterId r:id="rId18"/>
+    <p:notesMasterId r:id="rId19"/>
   </p:notesMasterIdLst>
   <p:handoutMasterIdLst>
-    <p:handoutMasterId r:id="rId19"/>
+    <p:handoutMasterId r:id="rId20"/>
   </p:handoutMasterIdLst>
   <p:sldIdLst>
     <p:sldId id="274" r:id="rId2"/>
@@ -26,7 +26,8 @@
     <p:sldId id="286" r:id="rId14"/>
     <p:sldId id="287" r:id="rId15"/>
     <p:sldId id="288" r:id="rId16"/>
-    <p:sldId id="289" r:id="rId17"/>
+    <p:sldId id="290" r:id="rId17"/>
+    <p:sldId id="289" r:id="rId18"/>
   </p:sldIdLst>
   <p:sldSz cx="9144000" cy="5715000" type="screen16x10"/>
   <p:notesSz cx="6858000" cy="9144000"/>
@@ -285,7 +286,7 @@
               <a:pPr>
                 <a:defRPr/>
               </a:pPr>
-              <a:t>8/21/2018</a:t>
+              <a:t>8/24/2018</a:t>
             </a:fld>
             <a:endParaRPr lang="en-US"/>
           </a:p>
@@ -509,7 +510,7 @@
               <a:pPr>
                 <a:defRPr/>
               </a:pPr>
-              <a:t>8/21/2018</a:t>
+              <a:t>8/24/2018</a:t>
             </a:fld>
             <a:endParaRPr lang="en-US"/>
           </a:p>
@@ -1026,7 +1027,7 @@
               <a:pPr>
                 <a:defRPr/>
               </a:pPr>
-              <a:t>8/21/2018</a:t>
+              <a:t>8/24/2018</a:t>
             </a:fld>
             <a:endParaRPr lang="en-US"/>
           </a:p>
@@ -1221,7 +1222,7 @@
               <a:pPr>
                 <a:defRPr/>
               </a:pPr>
-              <a:t>8/21/2018</a:t>
+              <a:t>8/24/2018</a:t>
             </a:fld>
             <a:endParaRPr lang="en-US"/>
           </a:p>
@@ -1426,7 +1427,7 @@
               <a:pPr>
                 <a:defRPr/>
               </a:pPr>
-              <a:t>8/21/2018</a:t>
+              <a:t>8/24/2018</a:t>
             </a:fld>
             <a:endParaRPr lang="en-US"/>
           </a:p>
@@ -1621,7 +1622,7 @@
               <a:pPr>
                 <a:defRPr/>
               </a:pPr>
-              <a:t>8/21/2018</a:t>
+              <a:t>8/24/2018</a:t>
             </a:fld>
             <a:endParaRPr lang="en-US"/>
           </a:p>
@@ -1893,7 +1894,7 @@
               <a:pPr>
                 <a:defRPr/>
               </a:pPr>
-              <a:t>8/21/2018</a:t>
+              <a:t>8/24/2018</a:t>
             </a:fld>
             <a:endParaRPr lang="en-US"/>
           </a:p>
@@ -2205,7 +2206,7 @@
               <a:pPr>
                 <a:defRPr/>
               </a:pPr>
-              <a:t>8/21/2018</a:t>
+              <a:t>8/24/2018</a:t>
             </a:fld>
             <a:endParaRPr lang="en-US"/>
           </a:p>
@@ -2651,7 +2652,7 @@
               <a:pPr>
                 <a:defRPr/>
               </a:pPr>
-              <a:t>8/21/2018</a:t>
+              <a:t>8/24/2018</a:t>
             </a:fld>
             <a:endParaRPr lang="en-US"/>
           </a:p>
@@ -2795,7 +2796,7 @@
               <a:pPr>
                 <a:defRPr/>
               </a:pPr>
-              <a:t>8/21/2018</a:t>
+              <a:t>8/24/2018</a:t>
             </a:fld>
             <a:endParaRPr lang="en-US"/>
           </a:p>
@@ -2917,7 +2918,7 @@
               <a:pPr>
                 <a:defRPr/>
               </a:pPr>
-              <a:t>8/21/2018</a:t>
+              <a:t>8/24/2018</a:t>
             </a:fld>
             <a:endParaRPr lang="en-US"/>
           </a:p>
@@ -3219,7 +3220,7 @@
               <a:pPr>
                 <a:defRPr/>
               </a:pPr>
-              <a:t>8/21/2018</a:t>
+              <a:t>8/24/2018</a:t>
             </a:fld>
             <a:endParaRPr lang="en-US"/>
           </a:p>
@@ -3504,7 +3505,7 @@
               <a:pPr>
                 <a:defRPr/>
               </a:pPr>
-              <a:t>8/21/2018</a:t>
+              <a:t>8/24/2018</a:t>
             </a:fld>
             <a:endParaRPr lang="en-US"/>
           </a:p>
@@ -3807,7 +3808,7 @@
               <a:pPr>
                 <a:defRPr/>
               </a:pPr>
-              <a:t>8/21/2018</a:t>
+              <a:t>8/24/2018</a:t>
             </a:fld>
             <a:endParaRPr lang="en-US"/>
           </a:p>
@@ -4607,7 +4608,33 @@
                 <a:latin typeface="Roboto Regular"/>
                 <a:cs typeface="Roboto Regular"/>
               </a:rPr>
-              <a:t>Predicting how capable each applicant </a:t>
+              <a:t>Predicting </a:t>
+            </a:r>
+            <a:r>
+              <a:rPr lang="en-US" sz="2400">
+                <a:solidFill>
+                  <a:schemeClr val="tx1">
+                    <a:lumMod val="65000"/>
+                    <a:lumOff val="35000"/>
+                  </a:schemeClr>
+                </a:solidFill>
+                <a:latin typeface="Roboto Regular"/>
+                <a:cs typeface="Roboto Regular"/>
+              </a:rPr>
+              <a:t>how likely </a:t>
+            </a:r>
+            <a:r>
+              <a:rPr lang="en-US" sz="2400" dirty="0">
+                <a:solidFill>
+                  <a:schemeClr val="tx1">
+                    <a:lumMod val="65000"/>
+                    <a:lumOff val="35000"/>
+                  </a:schemeClr>
+                </a:solidFill>
+                <a:latin typeface="Roboto Regular"/>
+                <a:cs typeface="Roboto Regular"/>
+              </a:rPr>
+              <a:t>each applicant </a:t>
             </a:r>
           </a:p>
           <a:p>
@@ -4878,13 +4905,13 @@
   <p:clrMapOvr>
     <a:masterClrMapping/>
   </p:clrMapOvr>
-  <mc:AlternateContent xmlns:mc="http://schemas.openxmlformats.org/markup-compatibility/2006">
-    <mc:Choice xmlns:p14="http://schemas.microsoft.com/office/powerpoint/2010/main" Requires="p14">
+  <mc:AlternateContent xmlns:mc="http://schemas.openxmlformats.org/markup-compatibility/2006" xmlns:p14="http://schemas.microsoft.com/office/powerpoint/2010/main">
+    <mc:Choice Requires="p14">
       <p:transition spd="med" p14:dur="700">
         <p:fade/>
       </p:transition>
     </mc:Choice>
-    <mc:Fallback>
+    <mc:Fallback xmlns="">
       <p:transition spd="med">
         <p:fade/>
       </p:transition>
@@ -5967,13 +5994,13 @@
   <p:clrMapOvr>
     <a:masterClrMapping/>
   </p:clrMapOvr>
-  <mc:AlternateContent xmlns:mc="http://schemas.openxmlformats.org/markup-compatibility/2006">
-    <mc:Choice xmlns:p14="http://schemas.microsoft.com/office/powerpoint/2010/main" Requires="p14">
+  <mc:AlternateContent xmlns:mc="http://schemas.openxmlformats.org/markup-compatibility/2006" xmlns:p14="http://schemas.microsoft.com/office/powerpoint/2010/main">
+    <mc:Choice Requires="p14">
       <p:transition spd="med" p14:dur="700">
         <p:fade/>
       </p:transition>
     </mc:Choice>
-    <mc:Fallback>
+    <mc:Fallback xmlns="">
       <p:transition spd="med">
         <p:fade/>
       </p:transition>
@@ -6776,13 +6803,13 @@
   <p:clrMapOvr>
     <a:masterClrMapping/>
   </p:clrMapOvr>
-  <mc:AlternateContent xmlns:mc="http://schemas.openxmlformats.org/markup-compatibility/2006">
-    <mc:Choice xmlns:p14="http://schemas.microsoft.com/office/powerpoint/2010/main" Requires="p14">
+  <mc:AlternateContent xmlns:mc="http://schemas.openxmlformats.org/markup-compatibility/2006" xmlns:p14="http://schemas.microsoft.com/office/powerpoint/2010/main">
+    <mc:Choice Requires="p14">
       <p:transition spd="med" p14:dur="700">
         <p:fade/>
       </p:transition>
     </mc:Choice>
-    <mc:Fallback>
+    <mc:Fallback xmlns="">
       <p:transition spd="med">
         <p:fade/>
       </p:transition>
@@ -7929,13 +7956,13 @@
   <p:clrMapOvr>
     <a:masterClrMapping/>
   </p:clrMapOvr>
-  <mc:AlternateContent xmlns:mc="http://schemas.openxmlformats.org/markup-compatibility/2006">
-    <mc:Choice xmlns:p14="http://schemas.microsoft.com/office/powerpoint/2010/main" Requires="p14">
+  <mc:AlternateContent xmlns:mc="http://schemas.openxmlformats.org/markup-compatibility/2006" xmlns:p14="http://schemas.microsoft.com/office/powerpoint/2010/main">
+    <mc:Choice Requires="p14">
       <p:transition spd="med" p14:dur="700">
         <p:fade/>
       </p:transition>
     </mc:Choice>
-    <mc:Fallback>
+    <mc:Fallback xmlns="">
       <p:transition spd="med">
         <p:fade/>
       </p:transition>
@@ -8864,13 +8891,13 @@
   <p:clrMapOvr>
     <a:masterClrMapping/>
   </p:clrMapOvr>
-  <mc:AlternateContent xmlns:mc="http://schemas.openxmlformats.org/markup-compatibility/2006">
-    <mc:Choice xmlns:p14="http://schemas.microsoft.com/office/powerpoint/2010/main" Requires="p14">
+  <mc:AlternateContent xmlns:mc="http://schemas.openxmlformats.org/markup-compatibility/2006" xmlns:p14="http://schemas.microsoft.com/office/powerpoint/2010/main">
+    <mc:Choice Requires="p14">
       <p:transition spd="med" p14:dur="700">
         <p:fade/>
       </p:transition>
     </mc:Choice>
-    <mc:Fallback>
+    <mc:Fallback xmlns="">
       <p:transition spd="med">
         <p:fade/>
       </p:transition>
@@ -10759,13 +10786,13 @@
   <p:clrMapOvr>
     <a:masterClrMapping/>
   </p:clrMapOvr>
-  <mc:AlternateContent xmlns:mc="http://schemas.openxmlformats.org/markup-compatibility/2006">
-    <mc:Choice xmlns:p14="http://schemas.microsoft.com/office/powerpoint/2010/main" Requires="p14">
+  <mc:AlternateContent xmlns:mc="http://schemas.openxmlformats.org/markup-compatibility/2006" xmlns:p14="http://schemas.microsoft.com/office/powerpoint/2010/main">
+    <mc:Choice Requires="p14">
       <p:transition spd="med" p14:dur="700">
         <p:fade/>
       </p:transition>
     </mc:Choice>
-    <mc:Fallback>
+    <mc:Fallback xmlns="">
       <p:transition spd="med">
         <p:fade/>
       </p:transition>
@@ -11506,13 +11533,13 @@
   <p:clrMapOvr>
     <a:masterClrMapping/>
   </p:clrMapOvr>
-  <mc:AlternateContent xmlns:mc="http://schemas.openxmlformats.org/markup-compatibility/2006">
-    <mc:Choice xmlns:p14="http://schemas.microsoft.com/office/powerpoint/2010/main" Requires="p14">
+  <mc:AlternateContent xmlns:mc="http://schemas.openxmlformats.org/markup-compatibility/2006" xmlns:p14="http://schemas.microsoft.com/office/powerpoint/2010/main">
+    <mc:Choice Requires="p14">
       <p:transition spd="med" p14:dur="700">
         <p:fade/>
       </p:transition>
     </mc:Choice>
-    <mc:Fallback>
+    <mc:Fallback xmlns="">
       <p:transition spd="med">
         <p:fade/>
       </p:transition>
@@ -11522,7 +11549,7 @@
 </file>
 
 <file path=ppt/slides/slide16.xml><?xml version="1.0" encoding="utf-8"?>
-<p:sld xmlns:a="http://schemas.openxmlformats.org/drawingml/2006/main" xmlns:r="http://schemas.openxmlformats.org/officeDocument/2006/relationships" xmlns:p="http://schemas.openxmlformats.org/presentationml/2006/main" show="0">
+<p:sld xmlns:a="http://schemas.openxmlformats.org/drawingml/2006/main" xmlns:r="http://schemas.openxmlformats.org/officeDocument/2006/relationships" xmlns:p="http://schemas.openxmlformats.org/presentationml/2006/main">
   <p:cSld>
     <p:spTree>
       <p:nvGrpSpPr>
@@ -11548,8 +11575,8 @@
         </p:nvSpPr>
         <p:spPr bwMode="auto">
           <a:xfrm>
-            <a:off x="3489312" y="159426"/>
-            <a:ext cx="4038288" cy="461665"/>
+            <a:off x="616512" y="251976"/>
+            <a:ext cx="8196288" cy="461665"/>
           </a:xfrm>
           <a:prstGeom prst="rect">
             <a:avLst/>
@@ -11700,7 +11727,7 @@
                 <a:latin typeface="Roboto Light"/>
                 <a:cs typeface="Roboto Light"/>
               </a:rPr>
-              <a:t>Questions?</a:t>
+              <a:t>Value add to this project.</a:t>
             </a:r>
           </a:p>
         </p:txBody>
@@ -12108,6 +12135,785 @@
       </p:sp>
       <p:sp>
         <p:nvSpPr>
+          <p:cNvPr id="12" name="Rectangle 11">
+            <a:extLst>
+              <a:ext uri="{FF2B5EF4-FFF2-40B4-BE49-F238E27FC236}">
+                <a16:creationId xmlns:a16="http://schemas.microsoft.com/office/drawing/2014/main" id="{FBF6F1E1-8D57-413D-AB9C-DEB442AD755C}"/>
+              </a:ext>
+            </a:extLst>
+          </p:cNvPr>
+          <p:cNvSpPr/>
+          <p:nvPr/>
+        </p:nvSpPr>
+        <p:spPr>
+          <a:xfrm>
+            <a:off x="476250" y="1564838"/>
+            <a:ext cx="8021814" cy="2862322"/>
+          </a:xfrm>
+          <a:prstGeom prst="rect">
+            <a:avLst/>
+          </a:prstGeom>
+        </p:spPr>
+        <p:txBody>
+          <a:bodyPr wrap="square">
+            <a:spAutoFit/>
+          </a:bodyPr>
+          <a:lstStyle/>
+          <a:p>
+            <a:pPr marL="285750" indent="-285750" eaLnBrk="1" hangingPunct="1">
+              <a:buFont typeface="Arial" panose="020B0604020202020204" pitchFamily="34" charset="0"/>
+              <a:buChar char="•"/>
+            </a:pPr>
+            <a:r>
+              <a:rPr lang="en-US" dirty="0">
+                <a:solidFill>
+                  <a:srgbClr val="576466"/>
+                </a:solidFill>
+                <a:latin typeface="Roboto Regular"/>
+                <a:cs typeface="Roboto Regular"/>
+              </a:rPr>
+              <a:t>Performed data wrangling / cleaning, setting up the data for analysis and model building.</a:t>
+            </a:r>
+          </a:p>
+          <a:p>
+            <a:pPr marL="285750" indent="-285750">
+              <a:buFont typeface="Arial" panose="020B0604020202020204" pitchFamily="34" charset="0"/>
+              <a:buChar char="•"/>
+            </a:pPr>
+            <a:r>
+              <a:rPr lang="en-US" dirty="0">
+                <a:solidFill>
+                  <a:srgbClr val="576466"/>
+                </a:solidFill>
+                <a:latin typeface="Roboto Regular"/>
+                <a:cs typeface="Roboto Regular"/>
+              </a:rPr>
+              <a:t>Dealt with data having anomalies.</a:t>
+            </a:r>
+          </a:p>
+          <a:p>
+            <a:pPr marL="285750" indent="-285750" eaLnBrk="1" hangingPunct="1">
+              <a:buFont typeface="Arial" panose="020B0604020202020204" pitchFamily="34" charset="0"/>
+              <a:buChar char="•"/>
+            </a:pPr>
+            <a:r>
+              <a:rPr lang="en-US" dirty="0">
+                <a:solidFill>
+                  <a:srgbClr val="576466"/>
+                </a:solidFill>
+                <a:latin typeface="Roboto Regular"/>
+                <a:cs typeface="Roboto Regular"/>
+              </a:rPr>
+              <a:t>Added Interaction variables.</a:t>
+            </a:r>
+          </a:p>
+          <a:p>
+            <a:pPr marL="285750" indent="-285750" eaLnBrk="1" hangingPunct="1">
+              <a:buFont typeface="Arial" panose="020B0604020202020204" pitchFamily="34" charset="0"/>
+              <a:buChar char="•"/>
+            </a:pPr>
+            <a:r>
+              <a:rPr lang="en-US" dirty="0">
+                <a:solidFill>
+                  <a:srgbClr val="576466"/>
+                </a:solidFill>
+                <a:latin typeface="Roboto Regular"/>
+                <a:cs typeface="Roboto Regular"/>
+              </a:rPr>
+              <a:t>Performed hyperparameters optimization.</a:t>
+            </a:r>
+          </a:p>
+          <a:p>
+            <a:pPr marL="285750" indent="-285750" eaLnBrk="1" hangingPunct="1">
+              <a:buFont typeface="Arial" panose="020B0604020202020204" pitchFamily="34" charset="0"/>
+              <a:buChar char="•"/>
+            </a:pPr>
+            <a:r>
+              <a:rPr lang="en-US" dirty="0">
+                <a:solidFill>
+                  <a:srgbClr val="576466"/>
+                </a:solidFill>
+                <a:latin typeface="Roboto Regular"/>
+                <a:cs typeface="Roboto Regular"/>
+              </a:rPr>
+              <a:t>Incorporated Domain Feature engineering.</a:t>
+            </a:r>
+          </a:p>
+          <a:p>
+            <a:pPr marL="285750" indent="-285750" eaLnBrk="1" hangingPunct="1">
+              <a:buFont typeface="Arial" panose="020B0604020202020204" pitchFamily="34" charset="0"/>
+              <a:buChar char="•"/>
+            </a:pPr>
+            <a:r>
+              <a:rPr lang="en-US" dirty="0">
+                <a:solidFill>
+                  <a:srgbClr val="576466"/>
+                </a:solidFill>
+                <a:latin typeface="Roboto Regular"/>
+                <a:cs typeface="Roboto Regular"/>
+              </a:rPr>
+              <a:t>Performed Exploratory Data Analysis.</a:t>
+            </a:r>
+          </a:p>
+          <a:p>
+            <a:pPr marL="285750" indent="-285750" eaLnBrk="1" hangingPunct="1">
+              <a:buFont typeface="Arial" panose="020B0604020202020204" pitchFamily="34" charset="0"/>
+              <a:buChar char="•"/>
+            </a:pPr>
+            <a:r>
+              <a:rPr lang="en-US" dirty="0">
+                <a:solidFill>
+                  <a:srgbClr val="576466"/>
+                </a:solidFill>
+                <a:latin typeface="Roboto Regular"/>
+                <a:cs typeface="Roboto Regular"/>
+              </a:rPr>
+              <a:t>Discovered patterns in data.</a:t>
+            </a:r>
+          </a:p>
+          <a:p>
+            <a:pPr marL="285750" indent="-285750" eaLnBrk="1" hangingPunct="1">
+              <a:buFont typeface="Arial" panose="020B0604020202020204" pitchFamily="34" charset="0"/>
+              <a:buChar char="•"/>
+            </a:pPr>
+            <a:r>
+              <a:rPr lang="en-US" dirty="0">
+                <a:solidFill>
+                  <a:srgbClr val="576466"/>
+                </a:solidFill>
+                <a:latin typeface="Roboto Regular"/>
+                <a:cs typeface="Roboto Regular"/>
+              </a:rPr>
+              <a:t>Built bagging based ensemble model.</a:t>
+            </a:r>
+          </a:p>
+          <a:p>
+            <a:pPr marL="285750" indent="-285750" eaLnBrk="1" hangingPunct="1">
+              <a:buFont typeface="Arial" panose="020B0604020202020204" pitchFamily="34" charset="0"/>
+              <a:buChar char="•"/>
+            </a:pPr>
+            <a:endParaRPr lang="en-US" dirty="0">
+              <a:solidFill>
+                <a:srgbClr val="576466"/>
+              </a:solidFill>
+              <a:latin typeface="Roboto Regular"/>
+              <a:cs typeface="Roboto Regular"/>
+            </a:endParaRPr>
+          </a:p>
+        </p:txBody>
+      </p:sp>
+    </p:spTree>
+    <p:extLst>
+      <p:ext uri="{BB962C8B-B14F-4D97-AF65-F5344CB8AC3E}">
+        <p14:creationId xmlns:p14="http://schemas.microsoft.com/office/powerpoint/2010/main" val="3683827223"/>
+      </p:ext>
+    </p:extLst>
+  </p:cSld>
+  <p:clrMapOvr>
+    <a:masterClrMapping/>
+  </p:clrMapOvr>
+  <mc:AlternateContent xmlns:mc="http://schemas.openxmlformats.org/markup-compatibility/2006" xmlns:p14="http://schemas.microsoft.com/office/powerpoint/2010/main">
+    <mc:Choice Requires="p14">
+      <p:transition spd="med" p14:dur="700">
+        <p:fade/>
+      </p:transition>
+    </mc:Choice>
+    <mc:Fallback xmlns="">
+      <p:transition spd="med">
+        <p:fade/>
+      </p:transition>
+    </mc:Fallback>
+  </mc:AlternateContent>
+</p:sld>
+</file>
+
+<file path=ppt/slides/slide17.xml><?xml version="1.0" encoding="utf-8"?>
+<p:sld xmlns:a="http://schemas.openxmlformats.org/drawingml/2006/main" xmlns:r="http://schemas.openxmlformats.org/officeDocument/2006/relationships" xmlns:p="http://schemas.openxmlformats.org/presentationml/2006/main" show="0">
+  <p:cSld>
+    <p:spTree>
+      <p:nvGrpSpPr>
+        <p:cNvPr id="1" name=""/>
+        <p:cNvGrpSpPr/>
+        <p:nvPr/>
+      </p:nvGrpSpPr>
+      <p:grpSpPr>
+        <a:xfrm>
+          <a:off x="0" y="0"/>
+          <a:ext cx="0" cy="0"/>
+          <a:chOff x="0" y="0"/>
+          <a:chExt cx="0" cy="0"/>
+        </a:xfrm>
+      </p:grpSpPr>
+      <p:sp>
+        <p:nvSpPr>
+          <p:cNvPr id="22529" name="TextBox 14"/>
+          <p:cNvSpPr txBox="1">
+            <a:spLocks noChangeArrowheads="1"/>
+          </p:cNvSpPr>
+          <p:nvPr/>
+        </p:nvSpPr>
+        <p:spPr bwMode="auto">
+          <a:xfrm>
+            <a:off x="3489312" y="159426"/>
+            <a:ext cx="4038288" cy="461665"/>
+          </a:xfrm>
+          <a:prstGeom prst="rect">
+            <a:avLst/>
+          </a:prstGeom>
+          <a:noFill/>
+          <a:ln>
+            <a:noFill/>
+          </a:ln>
+          <a:extLst>
+            <a:ext uri="{909E8E84-426E-40dd-AFC4-6F175D3DCCD1}">
+              <a14:hiddenFill xmlns="" xmlns:a14="http://schemas.microsoft.com/office/drawing/2010/main">
+                <a:solidFill>
+                  <a:srgbClr val="FFFFFF"/>
+                </a:solidFill>
+              </a14:hiddenFill>
+            </a:ext>
+            <a:ext uri="{91240B29-F687-4f45-9708-019B960494DF}">
+              <a14:hiddenLine xmlns="" xmlns:a14="http://schemas.microsoft.com/office/drawing/2010/main" w="9525">
+                <a:solidFill>
+                  <a:srgbClr val="000000"/>
+                </a:solidFill>
+                <a:miter lim="800000"/>
+                <a:headEnd/>
+                <a:tailEnd/>
+              </a14:hiddenLine>
+            </a:ext>
+          </a:extLst>
+        </p:spPr>
+        <p:txBody>
+          <a:bodyPr wrap="square">
+            <a:spAutoFit/>
+          </a:bodyPr>
+          <a:lstStyle>
+            <a:lvl1pPr eaLnBrk="0" hangingPunct="0">
+              <a:defRPr sz="2400">
+                <a:solidFill>
+                  <a:schemeClr val="tx1"/>
+                </a:solidFill>
+                <a:latin typeface="Calibri" charset="0"/>
+                <a:ea typeface="ＭＳ Ｐゴシック" charset="0"/>
+                <a:cs typeface="ＭＳ Ｐゴシック" charset="0"/>
+              </a:defRPr>
+            </a:lvl1pPr>
+            <a:lvl2pPr marL="742950" indent="-285750" eaLnBrk="0" hangingPunct="0">
+              <a:defRPr sz="2400">
+                <a:solidFill>
+                  <a:schemeClr val="tx1"/>
+                </a:solidFill>
+                <a:latin typeface="Calibri" charset="0"/>
+                <a:ea typeface="ＭＳ Ｐゴシック" charset="0"/>
+              </a:defRPr>
+            </a:lvl2pPr>
+            <a:lvl3pPr marL="1143000" indent="-228600" eaLnBrk="0" hangingPunct="0">
+              <a:defRPr sz="2400">
+                <a:solidFill>
+                  <a:schemeClr val="tx1"/>
+                </a:solidFill>
+                <a:latin typeface="Calibri" charset="0"/>
+                <a:ea typeface="ＭＳ Ｐゴシック" charset="0"/>
+              </a:defRPr>
+            </a:lvl3pPr>
+            <a:lvl4pPr marL="1600200" indent="-228600" eaLnBrk="0" hangingPunct="0">
+              <a:defRPr sz="2400">
+                <a:solidFill>
+                  <a:schemeClr val="tx1"/>
+                </a:solidFill>
+                <a:latin typeface="Calibri" charset="0"/>
+                <a:ea typeface="ＭＳ Ｐゴシック" charset="0"/>
+              </a:defRPr>
+            </a:lvl4pPr>
+            <a:lvl5pPr marL="2057400" indent="-228600" eaLnBrk="0" hangingPunct="0">
+              <a:defRPr sz="2400">
+                <a:solidFill>
+                  <a:schemeClr val="tx1"/>
+                </a:solidFill>
+                <a:latin typeface="Calibri" charset="0"/>
+                <a:ea typeface="ＭＳ Ｐゴシック" charset="0"/>
+              </a:defRPr>
+            </a:lvl5pPr>
+            <a:lvl6pPr marL="2514600" indent="-228600" eaLnBrk="0" fontAlgn="base" hangingPunct="0">
+              <a:spcBef>
+                <a:spcPct val="0"/>
+              </a:spcBef>
+              <a:spcAft>
+                <a:spcPct val="0"/>
+              </a:spcAft>
+              <a:defRPr sz="2400">
+                <a:solidFill>
+                  <a:schemeClr val="tx1"/>
+                </a:solidFill>
+                <a:latin typeface="Calibri" charset="0"/>
+                <a:ea typeface="ＭＳ Ｐゴシック" charset="0"/>
+              </a:defRPr>
+            </a:lvl6pPr>
+            <a:lvl7pPr marL="2971800" indent="-228600" eaLnBrk="0" fontAlgn="base" hangingPunct="0">
+              <a:spcBef>
+                <a:spcPct val="0"/>
+              </a:spcBef>
+              <a:spcAft>
+                <a:spcPct val="0"/>
+              </a:spcAft>
+              <a:defRPr sz="2400">
+                <a:solidFill>
+                  <a:schemeClr val="tx1"/>
+                </a:solidFill>
+                <a:latin typeface="Calibri" charset="0"/>
+                <a:ea typeface="ＭＳ Ｐゴシック" charset="0"/>
+              </a:defRPr>
+            </a:lvl7pPr>
+            <a:lvl8pPr marL="3429000" indent="-228600" eaLnBrk="0" fontAlgn="base" hangingPunct="0">
+              <a:spcBef>
+                <a:spcPct val="0"/>
+              </a:spcBef>
+              <a:spcAft>
+                <a:spcPct val="0"/>
+              </a:spcAft>
+              <a:defRPr sz="2400">
+                <a:solidFill>
+                  <a:schemeClr val="tx1"/>
+                </a:solidFill>
+                <a:latin typeface="Calibri" charset="0"/>
+                <a:ea typeface="ＭＳ Ｐゴシック" charset="0"/>
+              </a:defRPr>
+            </a:lvl8pPr>
+            <a:lvl9pPr marL="3886200" indent="-228600" eaLnBrk="0" fontAlgn="base" hangingPunct="0">
+              <a:spcBef>
+                <a:spcPct val="0"/>
+              </a:spcBef>
+              <a:spcAft>
+                <a:spcPct val="0"/>
+              </a:spcAft>
+              <a:defRPr sz="2400">
+                <a:solidFill>
+                  <a:schemeClr val="tx1"/>
+                </a:solidFill>
+                <a:latin typeface="Calibri" charset="0"/>
+                <a:ea typeface="ＭＳ Ｐゴシック" charset="0"/>
+              </a:defRPr>
+            </a:lvl9pPr>
+          </a:lstStyle>
+          <a:p>
+            <a:pPr eaLnBrk="1" hangingPunct="1"/>
+            <a:r>
+              <a:rPr lang="en-US" dirty="0">
+                <a:solidFill>
+                  <a:srgbClr val="E03424"/>
+                </a:solidFill>
+                <a:latin typeface="Roboto Light"/>
+                <a:cs typeface="Roboto Light"/>
+              </a:rPr>
+              <a:t>Questions?</a:t>
+            </a:r>
+          </a:p>
+        </p:txBody>
+      </p:sp>
+      <p:grpSp>
+        <p:nvGrpSpPr>
+          <p:cNvPr id="22530" name="Group 47"/>
+          <p:cNvGrpSpPr>
+            <a:grpSpLocks/>
+          </p:cNvGrpSpPr>
+          <p:nvPr/>
+        </p:nvGrpSpPr>
+        <p:grpSpPr bwMode="auto">
+          <a:xfrm>
+            <a:off x="0" y="-3175"/>
+            <a:ext cx="476250" cy="920750"/>
+            <a:chOff x="-1" y="7669"/>
+            <a:chExt cx="476265" cy="920432"/>
+          </a:xfrm>
+        </p:grpSpPr>
+        <p:sp>
+          <p:nvSpPr>
+            <p:cNvPr id="24" name="Rectangle 23"/>
+            <p:cNvSpPr/>
+            <p:nvPr/>
+          </p:nvSpPr>
+          <p:spPr>
+            <a:xfrm flipH="1">
+              <a:off x="-1" y="7669"/>
+              <a:ext cx="476265" cy="920432"/>
+            </a:xfrm>
+            <a:prstGeom prst="rect">
+              <a:avLst/>
+            </a:prstGeom>
+            <a:solidFill>
+              <a:srgbClr val="FF0000"/>
+            </a:solidFill>
+            <a:ln>
+              <a:noFill/>
+            </a:ln>
+            <a:effectLst/>
+          </p:spPr>
+          <p:style>
+            <a:lnRef idx="1">
+              <a:schemeClr val="accent1"/>
+            </a:lnRef>
+            <a:fillRef idx="3">
+              <a:schemeClr val="accent1"/>
+            </a:fillRef>
+            <a:effectRef idx="2">
+              <a:schemeClr val="accent1"/>
+            </a:effectRef>
+            <a:fontRef idx="minor">
+              <a:schemeClr val="lt1"/>
+            </a:fontRef>
+          </p:style>
+          <p:txBody>
+            <a:bodyPr anchor="ctr"/>
+            <a:lstStyle/>
+            <a:p>
+              <a:pPr algn="ctr" fontAlgn="auto">
+                <a:spcBef>
+                  <a:spcPts val="0"/>
+                </a:spcBef>
+                <a:spcAft>
+                  <a:spcPts val="0"/>
+                </a:spcAft>
+                <a:defRPr/>
+              </a:pPr>
+              <a:endParaRPr lang="en-US"/>
+            </a:p>
+          </p:txBody>
+        </p:sp>
+        <p:cxnSp>
+          <p:nvCxnSpPr>
+            <p:cNvPr id="25" name="Straight Connector 24"/>
+            <p:cNvCxnSpPr/>
+            <p:nvPr/>
+          </p:nvCxnSpPr>
+          <p:spPr>
+            <a:xfrm>
+              <a:off x="68264" y="656733"/>
+              <a:ext cx="339736" cy="0"/>
+            </a:xfrm>
+            <a:prstGeom prst="line">
+              <a:avLst/>
+            </a:prstGeom>
+            <a:ln w="12700">
+              <a:solidFill>
+                <a:schemeClr val="bg1"/>
+              </a:solidFill>
+            </a:ln>
+            <a:effectLst/>
+          </p:spPr>
+          <p:style>
+            <a:lnRef idx="2">
+              <a:schemeClr val="accent1"/>
+            </a:lnRef>
+            <a:fillRef idx="0">
+              <a:schemeClr val="accent1"/>
+            </a:fillRef>
+            <a:effectRef idx="1">
+              <a:schemeClr val="accent1"/>
+            </a:effectRef>
+            <a:fontRef idx="minor">
+              <a:schemeClr val="tx1"/>
+            </a:fontRef>
+          </p:style>
+        </p:cxnSp>
+        <p:cxnSp>
+          <p:nvCxnSpPr>
+            <p:cNvPr id="28" name="Straight Connector 27"/>
+            <p:cNvCxnSpPr/>
+            <p:nvPr/>
+          </p:nvCxnSpPr>
+          <p:spPr>
+            <a:xfrm>
+              <a:off x="68264" y="717037"/>
+              <a:ext cx="339736" cy="0"/>
+            </a:xfrm>
+            <a:prstGeom prst="line">
+              <a:avLst/>
+            </a:prstGeom>
+            <a:ln w="12700">
+              <a:solidFill>
+                <a:schemeClr val="bg1"/>
+              </a:solidFill>
+            </a:ln>
+            <a:effectLst/>
+          </p:spPr>
+          <p:style>
+            <a:lnRef idx="2">
+              <a:schemeClr val="accent1"/>
+            </a:lnRef>
+            <a:fillRef idx="0">
+              <a:schemeClr val="accent1"/>
+            </a:fillRef>
+            <a:effectRef idx="1">
+              <a:schemeClr val="accent1"/>
+            </a:effectRef>
+            <a:fontRef idx="minor">
+              <a:schemeClr val="tx1"/>
+            </a:fontRef>
+          </p:style>
+        </p:cxnSp>
+        <p:cxnSp>
+          <p:nvCxnSpPr>
+            <p:cNvPr id="29" name="Straight Connector 28"/>
+            <p:cNvCxnSpPr/>
+            <p:nvPr/>
+          </p:nvCxnSpPr>
+          <p:spPr>
+            <a:xfrm>
+              <a:off x="68264" y="778928"/>
+              <a:ext cx="339736" cy="0"/>
+            </a:xfrm>
+            <a:prstGeom prst="line">
+              <a:avLst/>
+            </a:prstGeom>
+            <a:ln w="12700">
+              <a:solidFill>
+                <a:schemeClr val="bg1"/>
+              </a:solidFill>
+            </a:ln>
+            <a:effectLst/>
+          </p:spPr>
+          <p:style>
+            <a:lnRef idx="2">
+              <a:schemeClr val="accent1"/>
+            </a:lnRef>
+            <a:fillRef idx="0">
+              <a:schemeClr val="accent1"/>
+            </a:fillRef>
+            <a:effectRef idx="1">
+              <a:schemeClr val="accent1"/>
+            </a:effectRef>
+            <a:fontRef idx="minor">
+              <a:schemeClr val="tx1"/>
+            </a:fontRef>
+          </p:style>
+        </p:cxnSp>
+      </p:grpSp>
+      <p:sp>
+        <p:nvSpPr>
+          <p:cNvPr id="88" name="Rectangle 87"/>
+          <p:cNvSpPr/>
+          <p:nvPr/>
+        </p:nvSpPr>
+        <p:spPr>
+          <a:xfrm flipH="1">
+            <a:off x="7070725" y="5257800"/>
+            <a:ext cx="2084388" cy="457200"/>
+          </a:xfrm>
+          <a:prstGeom prst="rect">
+            <a:avLst/>
+          </a:prstGeom>
+          <a:solidFill>
+            <a:srgbClr val="AFB6BC"/>
+          </a:solidFill>
+          <a:ln>
+            <a:noFill/>
+          </a:ln>
+          <a:effectLst/>
+        </p:spPr>
+        <p:style>
+          <a:lnRef idx="1">
+            <a:schemeClr val="accent1"/>
+          </a:lnRef>
+          <a:fillRef idx="3">
+            <a:schemeClr val="accent1"/>
+          </a:fillRef>
+          <a:effectRef idx="2">
+            <a:schemeClr val="accent1"/>
+          </a:effectRef>
+          <a:fontRef idx="minor">
+            <a:schemeClr val="lt1"/>
+          </a:fontRef>
+        </p:style>
+        <p:txBody>
+          <a:bodyPr anchor="ctr"/>
+          <a:lstStyle/>
+          <a:p>
+            <a:pPr algn="ctr" fontAlgn="auto">
+              <a:spcBef>
+                <a:spcPts val="0"/>
+              </a:spcBef>
+              <a:spcAft>
+                <a:spcPts val="0"/>
+              </a:spcAft>
+              <a:defRPr/>
+            </a:pPr>
+            <a:endParaRPr lang="en-US">
+              <a:latin typeface="Roboto Regular"/>
+              <a:cs typeface="Roboto Regular"/>
+            </a:endParaRPr>
+          </a:p>
+        </p:txBody>
+      </p:sp>
+      <p:sp>
+        <p:nvSpPr>
+          <p:cNvPr id="22545" name="TextBox 88"/>
+          <p:cNvSpPr txBox="1">
+            <a:spLocks noChangeArrowheads="1"/>
+          </p:cNvSpPr>
+          <p:nvPr/>
+        </p:nvSpPr>
+        <p:spPr bwMode="auto">
+          <a:xfrm>
+            <a:off x="8464554" y="5302250"/>
+            <a:ext cx="444352" cy="369332"/>
+          </a:xfrm>
+          <a:prstGeom prst="rect">
+            <a:avLst/>
+          </a:prstGeom>
+          <a:noFill/>
+          <a:ln>
+            <a:noFill/>
+          </a:ln>
+          <a:extLst>
+            <a:ext uri="{909E8E84-426E-40dd-AFC4-6F175D3DCCD1}">
+              <a14:hiddenFill xmlns="" xmlns:a14="http://schemas.microsoft.com/office/drawing/2010/main">
+                <a:solidFill>
+                  <a:srgbClr val="FFFFFF"/>
+                </a:solidFill>
+              </a14:hiddenFill>
+            </a:ext>
+            <a:ext uri="{91240B29-F687-4f45-9708-019B960494DF}">
+              <a14:hiddenLine xmlns="" xmlns:a14="http://schemas.microsoft.com/office/drawing/2010/main" w="9525">
+                <a:solidFill>
+                  <a:srgbClr val="000000"/>
+                </a:solidFill>
+                <a:miter lim="800000"/>
+                <a:headEnd/>
+                <a:tailEnd/>
+              </a14:hiddenLine>
+            </a:ext>
+          </a:extLst>
+        </p:spPr>
+        <p:txBody>
+          <a:bodyPr wrap="none">
+            <a:spAutoFit/>
+          </a:bodyPr>
+          <a:lstStyle>
+            <a:lvl1pPr eaLnBrk="0" hangingPunct="0">
+              <a:defRPr sz="2400">
+                <a:solidFill>
+                  <a:schemeClr val="tx1"/>
+                </a:solidFill>
+                <a:latin typeface="Calibri" charset="0"/>
+                <a:ea typeface="ＭＳ Ｐゴシック" charset="0"/>
+                <a:cs typeface="ＭＳ Ｐゴシック" charset="0"/>
+              </a:defRPr>
+            </a:lvl1pPr>
+            <a:lvl2pPr marL="742950" indent="-285750" eaLnBrk="0" hangingPunct="0">
+              <a:defRPr sz="2400">
+                <a:solidFill>
+                  <a:schemeClr val="tx1"/>
+                </a:solidFill>
+                <a:latin typeface="Calibri" charset="0"/>
+                <a:ea typeface="ＭＳ Ｐゴシック" charset="0"/>
+              </a:defRPr>
+            </a:lvl2pPr>
+            <a:lvl3pPr marL="1143000" indent="-228600" eaLnBrk="0" hangingPunct="0">
+              <a:defRPr sz="2400">
+                <a:solidFill>
+                  <a:schemeClr val="tx1"/>
+                </a:solidFill>
+                <a:latin typeface="Calibri" charset="0"/>
+                <a:ea typeface="ＭＳ Ｐゴシック" charset="0"/>
+              </a:defRPr>
+            </a:lvl3pPr>
+            <a:lvl4pPr marL="1600200" indent="-228600" eaLnBrk="0" hangingPunct="0">
+              <a:defRPr sz="2400">
+                <a:solidFill>
+                  <a:schemeClr val="tx1"/>
+                </a:solidFill>
+                <a:latin typeface="Calibri" charset="0"/>
+                <a:ea typeface="ＭＳ Ｐゴシック" charset="0"/>
+              </a:defRPr>
+            </a:lvl4pPr>
+            <a:lvl5pPr marL="2057400" indent="-228600" eaLnBrk="0" hangingPunct="0">
+              <a:defRPr sz="2400">
+                <a:solidFill>
+                  <a:schemeClr val="tx1"/>
+                </a:solidFill>
+                <a:latin typeface="Calibri" charset="0"/>
+                <a:ea typeface="ＭＳ Ｐゴシック" charset="0"/>
+              </a:defRPr>
+            </a:lvl5pPr>
+            <a:lvl6pPr marL="2514600" indent="-228600" eaLnBrk="0" fontAlgn="base" hangingPunct="0">
+              <a:spcBef>
+                <a:spcPct val="0"/>
+              </a:spcBef>
+              <a:spcAft>
+                <a:spcPct val="0"/>
+              </a:spcAft>
+              <a:defRPr sz="2400">
+                <a:solidFill>
+                  <a:schemeClr val="tx1"/>
+                </a:solidFill>
+                <a:latin typeface="Calibri" charset="0"/>
+                <a:ea typeface="ＭＳ Ｐゴシック" charset="0"/>
+              </a:defRPr>
+            </a:lvl6pPr>
+            <a:lvl7pPr marL="2971800" indent="-228600" eaLnBrk="0" fontAlgn="base" hangingPunct="0">
+              <a:spcBef>
+                <a:spcPct val="0"/>
+              </a:spcBef>
+              <a:spcAft>
+                <a:spcPct val="0"/>
+              </a:spcAft>
+              <a:defRPr sz="2400">
+                <a:solidFill>
+                  <a:schemeClr val="tx1"/>
+                </a:solidFill>
+                <a:latin typeface="Calibri" charset="0"/>
+                <a:ea typeface="ＭＳ Ｐゴシック" charset="0"/>
+              </a:defRPr>
+            </a:lvl7pPr>
+            <a:lvl8pPr marL="3429000" indent="-228600" eaLnBrk="0" fontAlgn="base" hangingPunct="0">
+              <a:spcBef>
+                <a:spcPct val="0"/>
+              </a:spcBef>
+              <a:spcAft>
+                <a:spcPct val="0"/>
+              </a:spcAft>
+              <a:defRPr sz="2400">
+                <a:solidFill>
+                  <a:schemeClr val="tx1"/>
+                </a:solidFill>
+                <a:latin typeface="Calibri" charset="0"/>
+                <a:ea typeface="ＭＳ Ｐゴシック" charset="0"/>
+              </a:defRPr>
+            </a:lvl8pPr>
+            <a:lvl9pPr marL="3886200" indent="-228600" eaLnBrk="0" fontAlgn="base" hangingPunct="0">
+              <a:spcBef>
+                <a:spcPct val="0"/>
+              </a:spcBef>
+              <a:spcAft>
+                <a:spcPct val="0"/>
+              </a:spcAft>
+              <a:defRPr sz="2400">
+                <a:solidFill>
+                  <a:schemeClr val="tx1"/>
+                </a:solidFill>
+                <a:latin typeface="Calibri" charset="0"/>
+                <a:ea typeface="ＭＳ Ｐゴシック" charset="0"/>
+              </a:defRPr>
+            </a:lvl9pPr>
+          </a:lstStyle>
+          <a:p>
+            <a:pPr eaLnBrk="1" hangingPunct="1"/>
+            <a:r>
+              <a:rPr lang="en-US" sz="1800" dirty="0">
+                <a:solidFill>
+                  <a:srgbClr val="FFFFFF"/>
+                </a:solidFill>
+                <a:latin typeface="Roboto Regular"/>
+                <a:cs typeface="Roboto Regular"/>
+              </a:rPr>
+              <a:t>16</a:t>
+            </a:r>
+          </a:p>
+        </p:txBody>
+      </p:sp>
+      <p:sp>
+        <p:nvSpPr>
           <p:cNvPr id="11" name="TextBox 14">
             <a:extLst>
               <a:ext uri="{FF2B5EF4-FFF2-40B4-BE49-F238E27FC236}">
@@ -12289,13 +13095,13 @@
   <p:clrMapOvr>
     <a:masterClrMapping/>
   </p:clrMapOvr>
-  <mc:AlternateContent xmlns:mc="http://schemas.openxmlformats.org/markup-compatibility/2006">
-    <mc:Choice xmlns:p14="http://schemas.microsoft.com/office/powerpoint/2010/main" Requires="p14">
+  <mc:AlternateContent xmlns:mc="http://schemas.openxmlformats.org/markup-compatibility/2006" xmlns:p14="http://schemas.microsoft.com/office/powerpoint/2010/main">
+    <mc:Choice Requires="p14">
       <p:transition spd="med" p14:dur="700">
         <p:fade/>
       </p:transition>
     </mc:Choice>
-    <mc:Fallback>
+    <mc:Fallback xmlns="">
       <p:transition spd="med">
         <p:fade/>
       </p:transition>
@@ -13074,13 +13880,13 @@
   <p:clrMapOvr>
     <a:masterClrMapping/>
   </p:clrMapOvr>
-  <mc:AlternateContent xmlns:mc="http://schemas.openxmlformats.org/markup-compatibility/2006">
-    <mc:Choice xmlns:p14="http://schemas.microsoft.com/office/powerpoint/2010/main" Requires="p14">
+  <mc:AlternateContent xmlns:mc="http://schemas.openxmlformats.org/markup-compatibility/2006" xmlns:p14="http://schemas.microsoft.com/office/powerpoint/2010/main">
+    <mc:Choice Requires="p14">
       <p:transition spd="med" p14:dur="700">
         <p:fade/>
       </p:transition>
     </mc:Choice>
-    <mc:Fallback>
+    <mc:Fallback xmlns="">
       <p:transition spd="med">
         <p:fade/>
       </p:transition>
@@ -14640,13 +15446,13 @@
   <p:clrMapOvr>
     <a:masterClrMapping/>
   </p:clrMapOvr>
-  <mc:AlternateContent xmlns:mc="http://schemas.openxmlformats.org/markup-compatibility/2006">
-    <mc:Choice xmlns:p14="http://schemas.microsoft.com/office/powerpoint/2010/main" Requires="p14">
+  <mc:AlternateContent xmlns:mc="http://schemas.openxmlformats.org/markup-compatibility/2006" xmlns:p14="http://schemas.microsoft.com/office/powerpoint/2010/main">
+    <mc:Choice Requires="p14">
       <p:transition spd="med" p14:dur="700">
         <p:fade/>
       </p:transition>
     </mc:Choice>
-    <mc:Fallback>
+    <mc:Fallback xmlns="">
       <p:transition spd="med">
         <p:fade/>
       </p:transition>
@@ -17052,13 +17858,13 @@
   <p:clrMapOvr>
     <a:masterClrMapping/>
   </p:clrMapOvr>
-  <mc:AlternateContent xmlns:mc="http://schemas.openxmlformats.org/markup-compatibility/2006">
-    <mc:Choice xmlns:p14="http://schemas.microsoft.com/office/powerpoint/2010/main" Requires="p14">
+  <mc:AlternateContent xmlns:mc="http://schemas.openxmlformats.org/markup-compatibility/2006" xmlns:p14="http://schemas.microsoft.com/office/powerpoint/2010/main">
+    <mc:Choice Requires="p14">
       <p:transition spd="med" p14:dur="700">
         <p:fade/>
       </p:transition>
     </mc:Choice>
-    <mc:Fallback>
+    <mc:Fallback xmlns="">
       <p:transition spd="med">
         <p:fade/>
       </p:transition>
@@ -18555,13 +19361,13 @@
   <p:clrMapOvr>
     <a:masterClrMapping/>
   </p:clrMapOvr>
-  <mc:AlternateContent xmlns:mc="http://schemas.openxmlformats.org/markup-compatibility/2006">
-    <mc:Choice xmlns:p14="http://schemas.microsoft.com/office/powerpoint/2010/main" Requires="p14">
+  <mc:AlternateContent xmlns:mc="http://schemas.openxmlformats.org/markup-compatibility/2006" xmlns:p14="http://schemas.microsoft.com/office/powerpoint/2010/main">
+    <mc:Choice Requires="p14">
       <p:transition spd="med" p14:dur="700">
         <p:fade/>
       </p:transition>
     </mc:Choice>
-    <mc:Fallback>
+    <mc:Fallback xmlns="">
       <p:transition spd="med">
         <p:fade/>
       </p:transition>
@@ -19770,13 +20576,13 @@
   <p:clrMapOvr>
     <a:masterClrMapping/>
   </p:clrMapOvr>
-  <mc:AlternateContent xmlns:mc="http://schemas.openxmlformats.org/markup-compatibility/2006">
-    <mc:Choice xmlns:p14="http://schemas.microsoft.com/office/powerpoint/2010/main" Requires="p14">
+  <mc:AlternateContent xmlns:mc="http://schemas.openxmlformats.org/markup-compatibility/2006" xmlns:p14="http://schemas.microsoft.com/office/powerpoint/2010/main">
+    <mc:Choice Requires="p14">
       <p:transition spd="med" p14:dur="700">
         <p:fade/>
       </p:transition>
     </mc:Choice>
-    <mc:Fallback>
+    <mc:Fallback xmlns="">
       <p:transition spd="med">
         <p:fade/>
       </p:transition>
@@ -20865,13 +21671,13 @@
   <p:clrMapOvr>
     <a:masterClrMapping/>
   </p:clrMapOvr>
-  <mc:AlternateContent xmlns:mc="http://schemas.openxmlformats.org/markup-compatibility/2006">
-    <mc:Choice xmlns:p14="http://schemas.microsoft.com/office/powerpoint/2010/main" Requires="p14">
+  <mc:AlternateContent xmlns:mc="http://schemas.openxmlformats.org/markup-compatibility/2006" xmlns:p14="http://schemas.microsoft.com/office/powerpoint/2010/main">
+    <mc:Choice Requires="p14">
       <p:transition spd="med" p14:dur="700">
         <p:fade/>
       </p:transition>
     </mc:Choice>
-    <mc:Fallback>
+    <mc:Fallback xmlns="">
       <p:transition spd="med">
         <p:fade/>
       </p:transition>
@@ -21908,13 +22714,13 @@
   <p:clrMapOvr>
     <a:masterClrMapping/>
   </p:clrMapOvr>
-  <mc:AlternateContent xmlns:mc="http://schemas.openxmlformats.org/markup-compatibility/2006">
-    <mc:Choice xmlns:p14="http://schemas.microsoft.com/office/powerpoint/2010/main" Requires="p14">
+  <mc:AlternateContent xmlns:mc="http://schemas.openxmlformats.org/markup-compatibility/2006" xmlns:p14="http://schemas.microsoft.com/office/powerpoint/2010/main">
+    <mc:Choice Requires="p14">
       <p:transition spd="med" p14:dur="700">
         <p:fade/>
       </p:transition>
     </mc:Choice>
-    <mc:Fallback>
+    <mc:Fallback xmlns="">
       <p:transition spd="med">
         <p:fade/>
       </p:transition>
@@ -23026,13 +23832,13 @@
   <p:clrMapOvr>
     <a:masterClrMapping/>
   </p:clrMapOvr>
-  <mc:AlternateContent xmlns:mc="http://schemas.openxmlformats.org/markup-compatibility/2006">
-    <mc:Choice xmlns:p14="http://schemas.microsoft.com/office/powerpoint/2010/main" Requires="p14">
+  <mc:AlternateContent xmlns:mc="http://schemas.openxmlformats.org/markup-compatibility/2006" xmlns:p14="http://schemas.microsoft.com/office/powerpoint/2010/main">
+    <mc:Choice Requires="p14">
       <p:transition spd="med" p14:dur="700">
         <p:fade/>
       </p:transition>
     </mc:Choice>
-    <mc:Fallback>
+    <mc:Fallback xmlns="">
       <p:transition spd="med">
         <p:fade/>
       </p:transition>

</xml_diff>